<commit_message>
added missing PDF and PPTS
</commit_message>
<xml_diff>
--- a/ActiveNet Trainer/Courses/ActiveNet Orientation (Intro Course)/WelcomeToActiveNet.pptx
+++ b/ActiveNet Trainer/Courses/ActiveNet Orientation (Intro Course)/WelcomeToActiveNet.pptx
@@ -2883,7 +2883,7 @@
   <dgm:whole/>
   <dgm:extLst>
     <a:ext uri="http://schemas.microsoft.com/office/drawing/2008/diagram">
-      <dsp:dataModelExt xmlns:dsp="http://schemas.microsoft.com/office/drawing/2008/diagram" relId="rId9" minVer="http://schemas.openxmlformats.org/drawingml/2006/diagram"/>
+      <dsp:dataModelExt xmlns:dsp="http://schemas.microsoft.com/office/drawing/2008/diagram" relId="rId8" minVer="http://schemas.openxmlformats.org/drawingml/2006/diagram"/>
     </a:ext>
   </dgm:extLst>
 </dgm:dataModel>
@@ -2949,15 +2949,7 @@
         <a:p>
           <a:r>
             <a:rPr lang="en-US" dirty="0" smtClean="0"/>
-            <a:t>Before you continue with the course material, </a:t>
-          </a:r>
-          <a:r>
-            <a:rPr lang="en-US" dirty="0" smtClean="0"/>
-            <a:t>note that each exam’s pass-rate. This is the grade you must get on the exam in order to continue. You </a:t>
-          </a:r>
-          <a:r>
-            <a:rPr lang="en-US" dirty="0" smtClean="0"/>
-            <a:t>only have 2 attempts to pass before your access is restricted.</a:t>
+            <a:t>Before you continue with the course material, note that each exam’s pass-rate. This is the grade you must get on the exam in order to continue. You only have 2 attempts to pass before your access is restricted.</a:t>
           </a:r>
           <a:endParaRPr lang="en-US" dirty="0"/>
         </a:p>
@@ -3430,7 +3422,7 @@
   <dgm:whole/>
   <dgm:extLst>
     <a:ext uri="http://schemas.microsoft.com/office/drawing/2008/diagram">
-      <dsp:dataModelExt xmlns:dsp="http://schemas.microsoft.com/office/drawing/2008/diagram" relId="rId8" minVer="http://schemas.openxmlformats.org/drawingml/2006/diagram"/>
+      <dsp:dataModelExt xmlns:dsp="http://schemas.microsoft.com/office/drawing/2008/diagram" relId="rId7" minVer="http://schemas.openxmlformats.org/drawingml/2006/diagram"/>
     </a:ext>
   </dgm:extLst>
 </dgm:dataModel>
@@ -3748,7 +3740,7 @@
   <dgm:whole/>
   <dgm:extLst>
     <a:ext uri="http://schemas.microsoft.com/office/drawing/2008/diagram">
-      <dsp:dataModelExt xmlns:dsp="http://schemas.microsoft.com/office/drawing/2008/diagram" relId="rId8" minVer="http://schemas.openxmlformats.org/drawingml/2006/diagram"/>
+      <dsp:dataModelExt xmlns:dsp="http://schemas.microsoft.com/office/drawing/2008/diagram" relId="rId7" minVer="http://schemas.openxmlformats.org/drawingml/2006/diagram"/>
     </a:ext>
   </dgm:extLst>
 </dgm:dataModel>
@@ -4429,15 +4421,7 @@
           </a:pPr>
           <a:r>
             <a:rPr lang="en-US" sz="1200" kern="1200" dirty="0" smtClean="0"/>
-            <a:t>Before you continue with the course material, </a:t>
-          </a:r>
-          <a:r>
-            <a:rPr lang="en-US" sz="1200" kern="1200" dirty="0" smtClean="0"/>
-            <a:t>note that each exam’s pass-rate. This is the grade you must get on the exam in order to continue. You </a:t>
-          </a:r>
-          <a:r>
-            <a:rPr lang="en-US" sz="1200" kern="1200" dirty="0" smtClean="0"/>
-            <a:t>only have 2 attempts to pass before your access is restricted.</a:t>
+            <a:t>Before you continue with the course material, note that each exam’s pass-rate. This is the grade you must get on the exam in order to continue. You only have 2 attempts to pass before your access is restricted.</a:t>
           </a:r>
           <a:endParaRPr lang="en-US" sz="1200" kern="1200" dirty="0"/>
         </a:p>
@@ -9201,7 +9185,7 @@
           <a:p>
             <a:fld id="{06D2A18A-E17A-443E-8915-1E089140DE46}" type="datetimeFigureOut">
               <a:rPr lang="en-US" smtClean="0"/>
-              <a:t>12/7/2016</a:t>
+              <a:t>12/21/2016</a:t>
             </a:fld>
             <a:endParaRPr lang="en-US"/>
           </a:p>
@@ -9684,7 +9668,7 @@
           <a:p>
             <a:fld id="{8472C7DE-940F-F84D-87FC-CB6C77FFB87A}" type="datetimeFigureOut">
               <a:rPr lang="en-US" smtClean="0"/>
-              <a:t>12/7/2016</a:t>
+              <a:t>12/21/2016</a:t>
             </a:fld>
             <a:endParaRPr lang="en-US"/>
           </a:p>
@@ -9854,7 +9838,7 @@
           <a:p>
             <a:fld id="{8472C7DE-940F-F84D-87FC-CB6C77FFB87A}" type="datetimeFigureOut">
               <a:rPr lang="en-US" smtClean="0"/>
-              <a:t>12/7/2016</a:t>
+              <a:t>12/21/2016</a:t>
             </a:fld>
             <a:endParaRPr lang="en-US"/>
           </a:p>
@@ -10034,7 +10018,7 @@
           <a:p>
             <a:fld id="{8472C7DE-940F-F84D-87FC-CB6C77FFB87A}" type="datetimeFigureOut">
               <a:rPr lang="en-US" smtClean="0"/>
-              <a:t>12/7/2016</a:t>
+              <a:t>12/21/2016</a:t>
             </a:fld>
             <a:endParaRPr lang="en-US"/>
           </a:p>
@@ -10204,7 +10188,7 @@
           <a:p>
             <a:fld id="{8472C7DE-940F-F84D-87FC-CB6C77FFB87A}" type="datetimeFigureOut">
               <a:rPr lang="en-US" smtClean="0"/>
-              <a:t>12/7/2016</a:t>
+              <a:t>12/21/2016</a:t>
             </a:fld>
             <a:endParaRPr lang="en-US"/>
           </a:p>
@@ -10448,7 +10432,7 @@
           <a:p>
             <a:fld id="{8472C7DE-940F-F84D-87FC-CB6C77FFB87A}" type="datetimeFigureOut">
               <a:rPr lang="en-US" smtClean="0"/>
-              <a:t>12/7/2016</a:t>
+              <a:t>12/21/2016</a:t>
             </a:fld>
             <a:endParaRPr lang="en-US"/>
           </a:p>
@@ -10680,7 +10664,7 @@
           <a:p>
             <a:fld id="{8472C7DE-940F-F84D-87FC-CB6C77FFB87A}" type="datetimeFigureOut">
               <a:rPr lang="en-US" smtClean="0"/>
-              <a:t>12/7/2016</a:t>
+              <a:t>12/21/2016</a:t>
             </a:fld>
             <a:endParaRPr lang="en-US"/>
           </a:p>
@@ -11047,7 +11031,7 @@
           <a:p>
             <a:fld id="{8472C7DE-940F-F84D-87FC-CB6C77FFB87A}" type="datetimeFigureOut">
               <a:rPr lang="en-US" smtClean="0"/>
-              <a:t>12/7/2016</a:t>
+              <a:t>12/21/2016</a:t>
             </a:fld>
             <a:endParaRPr lang="en-US"/>
           </a:p>
@@ -11165,7 +11149,7 @@
           <a:p>
             <a:fld id="{8472C7DE-940F-F84D-87FC-CB6C77FFB87A}" type="datetimeFigureOut">
               <a:rPr lang="en-US" smtClean="0"/>
-              <a:t>12/7/2016</a:t>
+              <a:t>12/21/2016</a:t>
             </a:fld>
             <a:endParaRPr lang="en-US"/>
           </a:p>
@@ -11260,7 +11244,7 @@
           <a:p>
             <a:fld id="{8472C7DE-940F-F84D-87FC-CB6C77FFB87A}" type="datetimeFigureOut">
               <a:rPr lang="en-US" smtClean="0"/>
-              <a:t>12/7/2016</a:t>
+              <a:t>12/21/2016</a:t>
             </a:fld>
             <a:endParaRPr lang="en-US"/>
           </a:p>
@@ -11537,7 +11521,7 @@
           <a:p>
             <a:fld id="{8472C7DE-940F-F84D-87FC-CB6C77FFB87A}" type="datetimeFigureOut">
               <a:rPr lang="en-US" smtClean="0"/>
-              <a:t>12/7/2016</a:t>
+              <a:t>12/21/2016</a:t>
             </a:fld>
             <a:endParaRPr lang="en-US"/>
           </a:p>
@@ -11794,7 +11778,7 @@
           <a:p>
             <a:fld id="{8472C7DE-940F-F84D-87FC-CB6C77FFB87A}" type="datetimeFigureOut">
               <a:rPr lang="en-US" smtClean="0"/>
-              <a:t>12/7/2016</a:t>
+              <a:t>12/21/2016</a:t>
             </a:fld>
             <a:endParaRPr lang="en-US"/>
           </a:p>
@@ -12007,7 +11991,7 @@
           <a:p>
             <a:fld id="{8472C7DE-940F-F84D-87FC-CB6C77FFB87A}" type="datetimeFigureOut">
               <a:rPr lang="en-US" smtClean="0"/>
-              <a:t>12/7/2016</a:t>
+              <a:t>12/21/2016</a:t>
             </a:fld>
             <a:endParaRPr lang="en-US"/>
           </a:p>
@@ -17183,15 +17167,7 @@
               </a:pPr>
               <a:r>
                 <a:rPr lang="en-US" sz="1500" kern="1200" dirty="0" smtClean="0"/>
-                <a:t>ActiveNet is full of features to help us accomplish everyday tasks. From Course Registrations, Facility Reservations and Customer Organization to Lagoon Permits, Point of Sale Procedures and Sports Leagues, we use this </a:t>
-              </a:r>
-              <a:r>
-                <a:rPr lang="en-US" sz="1500" kern="1200" dirty="0" smtClean="0"/>
-                <a:t>important </a:t>
-              </a:r>
-              <a:r>
-                <a:rPr lang="en-US" sz="1500" kern="1200" dirty="0" smtClean="0"/>
-                <a:t>system in a meaningful manner. </a:t>
+                <a:t>ActiveNet is full of features to help us accomplish everyday tasks. From Course Registrations, Facility Reservations and Customer Organization to Lagoon Permits, Point of Sale Procedures and Sports Leagues, we use this important system in a meaningful manner. </a:t>
               </a:r>
               <a:endParaRPr lang="en-US" sz="1500" kern="1200" dirty="0"/>
             </a:p>
@@ -17992,7 +17968,7 @@
       <p:sp>
         <p:nvSpPr>
           <p:cNvPr id="21" name="Rounded Rectangle 20">
-            <a:hlinkClick r:id="rId3" action="ppaction://hlinksldjump"/>
+            <a:hlinkClick r:id="" action="ppaction://hlinkshowjump?jump=previousslide"/>
           </p:cNvPr>
           <p:cNvSpPr/>
           <p:nvPr/>
@@ -19220,7 +19196,7 @@
       <p:sp>
         <p:nvSpPr>
           <p:cNvPr id="21" name="Rounded Rectangle 20">
-            <a:hlinkClick r:id="rId3" action="ppaction://hlinksldjump"/>
+            <a:hlinkClick r:id="" action="ppaction://hlinkshowjump?jump=previousslide"/>
           </p:cNvPr>
           <p:cNvSpPr/>
           <p:nvPr/>
@@ -19359,7 +19335,7 @@
             <p:nvPr/>
           </p:nvPicPr>
           <p:blipFill>
-            <a:blip r:embed="rId4"/>
+            <a:blip r:embed="rId3"/>
             <a:stretch>
               <a:fillRect/>
             </a:stretch>
@@ -19527,7 +19503,7 @@
             <p:nvPr/>
           </p:nvPicPr>
           <p:blipFill>
-            <a:blip r:embed="rId5"/>
+            <a:blip r:embed="rId4"/>
             <a:stretch>
               <a:fillRect/>
             </a:stretch>
@@ -19559,7 +19535,7 @@
             <p:nvPr/>
           </p:nvPicPr>
           <p:blipFill>
-            <a:blip r:embed="rId6">
+            <a:blip r:embed="rId5">
               <a:extLst>
                 <a:ext uri="{28A0092B-C50C-407E-A947-70E740481C1C}">
                   <a14:useLocalDpi xmlns:a14="http://schemas.microsoft.com/office/drawing/2010/main" val="0"/>
@@ -19873,7 +19849,7 @@
       <p:sp>
         <p:nvSpPr>
           <p:cNvPr id="21" name="Rounded Rectangle 20">
-            <a:hlinkClick r:id="rId4" action="ppaction://hlinksldjump"/>
+            <a:hlinkClick r:id="" action="ppaction://hlinkshowjump?jump=previousslide"/>
           </p:cNvPr>
           <p:cNvSpPr/>
           <p:nvPr/>
@@ -19957,7 +19933,7 @@
         </p:xfrm>
         <a:graphic>
           <a:graphicData uri="http://schemas.openxmlformats.org/drawingml/2006/diagram">
-            <dgm:relIds xmlns:dgm="http://schemas.openxmlformats.org/drawingml/2006/diagram" xmlns:r="http://schemas.openxmlformats.org/officeDocument/2006/relationships" r:dm="rId5" r:lo="rId6" r:qs="rId7" r:cs="rId8"/>
+            <dgm:relIds xmlns:dgm="http://schemas.openxmlformats.org/drawingml/2006/diagram" xmlns:r="http://schemas.openxmlformats.org/officeDocument/2006/relationships" r:dm="rId4" r:lo="rId5" r:qs="rId6" r:cs="rId7"/>
           </a:graphicData>
         </a:graphic>
       </p:graphicFrame>
@@ -20248,7 +20224,7 @@
       <p:sp>
         <p:nvSpPr>
           <p:cNvPr id="21" name="Rounded Rectangle 20">
-            <a:hlinkClick r:id="rId3" action="ppaction://hlinksldjump"/>
+            <a:hlinkClick r:id="" action="ppaction://hlinkshowjump?jump=previousslide"/>
           </p:cNvPr>
           <p:cNvSpPr/>
           <p:nvPr/>
@@ -20332,7 +20308,7 @@
         </p:xfrm>
         <a:graphic>
           <a:graphicData uri="http://schemas.openxmlformats.org/drawingml/2006/diagram">
-            <dgm:relIds xmlns:dgm="http://schemas.openxmlformats.org/drawingml/2006/diagram" xmlns:r="http://schemas.openxmlformats.org/officeDocument/2006/relationships" r:dm="rId4" r:lo="rId5" r:qs="rId6" r:cs="rId7"/>
+            <dgm:relIds xmlns:dgm="http://schemas.openxmlformats.org/drawingml/2006/diagram" xmlns:r="http://schemas.openxmlformats.org/officeDocument/2006/relationships" r:dm="rId3" r:lo="rId4" r:qs="rId5" r:cs="rId6"/>
           </a:graphicData>
         </a:graphic>
       </p:graphicFrame>
@@ -20562,7 +20538,7 @@
       <p:sp>
         <p:nvSpPr>
           <p:cNvPr id="21" name="Rounded Rectangle 20">
-            <a:hlinkClick r:id="rId3" action="ppaction://hlinksldjump"/>
+            <a:hlinkClick r:id="" action="ppaction://hlinkshowjump?jump=previousslide"/>
           </p:cNvPr>
           <p:cNvSpPr/>
           <p:nvPr/>
@@ -20646,7 +20622,7 @@
         </p:xfrm>
         <a:graphic>
           <a:graphicData uri="http://schemas.openxmlformats.org/drawingml/2006/diagram">
-            <dgm:relIds xmlns:dgm="http://schemas.openxmlformats.org/drawingml/2006/diagram" xmlns:r="http://schemas.openxmlformats.org/officeDocument/2006/relationships" r:dm="rId4" r:lo="rId5" r:qs="rId6" r:cs="rId7"/>
+            <dgm:relIds xmlns:dgm="http://schemas.openxmlformats.org/drawingml/2006/diagram" xmlns:r="http://schemas.openxmlformats.org/officeDocument/2006/relationships" r:dm="rId3" r:lo="rId4" r:qs="rId5" r:cs="rId6"/>
           </a:graphicData>
         </a:graphic>
       </p:graphicFrame>
@@ -20728,7 +20704,7 @@
         <p:pic>
           <p:nvPicPr>
             <p:cNvPr id="4" name="Picture 3">
-              <a:hlinkClick r:id="rId9" action="ppaction://hlinksldjump"/>
+              <a:hlinkClick r:id="rId8" action="ppaction://hlinksldjump"/>
             </p:cNvPr>
             <p:cNvPicPr>
               <a:picLocks noChangeAspect="1"/>
@@ -20736,7 +20712,7 @@
             <p:nvPr/>
           </p:nvPicPr>
           <p:blipFill>
-            <a:blip r:embed="rId10">
+            <a:blip r:embed="rId9">
               <a:extLst>
                 <a:ext uri="{28A0092B-C50C-407E-A947-70E740481C1C}">
                   <a14:useLocalDpi xmlns:a14="http://schemas.microsoft.com/office/drawing/2010/main" val="0"/>
@@ -20760,7 +20736,7 @@
         <p:pic>
           <p:nvPicPr>
             <p:cNvPr id="5" name="Picture 4">
-              <a:hlinkClick r:id="rId11" action="ppaction://hlinksldjump"/>
+              <a:hlinkClick r:id="rId10" action="ppaction://hlinksldjump"/>
             </p:cNvPr>
             <p:cNvPicPr>
               <a:picLocks noChangeAspect="1"/>
@@ -20768,7 +20744,7 @@
             <p:nvPr/>
           </p:nvPicPr>
           <p:blipFill>
-            <a:blip r:embed="rId12">
+            <a:blip r:embed="rId11">
               <a:extLst>
                 <a:ext uri="{28A0092B-C50C-407E-A947-70E740481C1C}">
                   <a14:useLocalDpi xmlns:a14="http://schemas.microsoft.com/office/drawing/2010/main" val="0"/>
@@ -20792,7 +20768,7 @@
         <p:pic>
           <p:nvPicPr>
             <p:cNvPr id="6" name="Picture 5">
-              <a:hlinkClick r:id="rId13" action="ppaction://hlinksldjump"/>
+              <a:hlinkClick r:id="rId12" action="ppaction://hlinksldjump"/>
             </p:cNvPr>
             <p:cNvPicPr>
               <a:picLocks noChangeAspect="1"/>
@@ -20800,7 +20776,7 @@
             <p:nvPr/>
           </p:nvPicPr>
           <p:blipFill>
-            <a:blip r:embed="rId14">
+            <a:blip r:embed="rId13">
               <a:extLst>
                 <a:ext uri="{28A0092B-C50C-407E-A947-70E740481C1C}">
                   <a14:useLocalDpi xmlns:a14="http://schemas.microsoft.com/office/drawing/2010/main" val="0"/>
@@ -20824,7 +20800,7 @@
         <p:pic>
           <p:nvPicPr>
             <p:cNvPr id="7" name="Picture 6">
-              <a:hlinkClick r:id="rId15" action="ppaction://hlinksldjump"/>
+              <a:hlinkClick r:id="rId14" action="ppaction://hlinksldjump"/>
             </p:cNvPr>
             <p:cNvPicPr>
               <a:picLocks noChangeAspect="1"/>
@@ -20832,7 +20808,7 @@
             <p:nvPr/>
           </p:nvPicPr>
           <p:blipFill>
-            <a:blip r:embed="rId16">
+            <a:blip r:embed="rId15">
               <a:extLst>
                 <a:ext uri="{28A0092B-C50C-407E-A947-70E740481C1C}">
                   <a14:useLocalDpi xmlns:a14="http://schemas.microsoft.com/office/drawing/2010/main" val="0"/>

</xml_diff>